<commit_message>
Partially Pre-Apply: Clarify Figure 4 and associated text in 2.6.2 FHIR-36985
</commit_message>
<xml_diff>
--- a/input/images/source/Workflow Images.pptx
+++ b/input/images/source/Workflow Images.pptx
@@ -733,8 +733,8 @@
         </p:nvSpPr>
         <p:spPr>
           <a:xfrm>
-            <a:off x="381300" y="685800"/>
-            <a:ext cx="6096075" cy="3429000"/>
+            <a:off x="381000" y="685800"/>
+            <a:ext cx="6096000" cy="3429000"/>
           </a:xfrm>
           <a:custGeom>
             <a:avLst/>
@@ -12813,7 +12813,11 @@
               </a:spcAft>
               <a:buNone/>
             </a:pPr>
-            <a:endParaRPr/>
+            <a:r>
+              <a:rPr lang="en-US" dirty="0"/>
+              <a:t>A</a:t>
+            </a:r>
+            <a:endParaRPr dirty="0"/>
           </a:p>
         </p:txBody>
       </p:sp>
@@ -14100,7 +14104,7 @@
         <p:fade/>
       </p:transition>
     </mc:Choice>
-    <mc:Fallback xmlns:ahyp="http://schemas.microsoft.com/office/drawing/2018/hyperlinkcolor" xmlns:p15="http://schemas.microsoft.com/office/powerpoint/2012/main" xmlns:com="http://schemas.openxmlformats.org/drawingml/2006/compatibility" xmlns:pvml="urn:schemas-microsoft-com:office:powerpoint" xmlns:v="urn:schemas-microsoft-com:vml" xmlns:o="urn:schemas-microsoft-com:office:office" xmlns:dgm="http://schemas.openxmlformats.org/drawingml/2006/diagram" xmlns:c="http://schemas.openxmlformats.org/drawingml/2006/chart" xmlns:mv="urn:schemas-microsoft-com:mac:vml" xmlns="">
+    <mc:Fallback xmlns="" xmlns:mv="urn:schemas-microsoft-com:mac:vml" xmlns:c="http://schemas.openxmlformats.org/drawingml/2006/chart" xmlns:dgm="http://schemas.openxmlformats.org/drawingml/2006/diagram" xmlns:o="urn:schemas-microsoft-com:office:office" xmlns:v="urn:schemas-microsoft-com:vml" xmlns:pvml="urn:schemas-microsoft-com:office:powerpoint" xmlns:com="http://schemas.openxmlformats.org/drawingml/2006/compatibility" xmlns:p15="http://schemas.microsoft.com/office/powerpoint/2012/main" xmlns:ahyp="http://schemas.microsoft.com/office/drawing/2018/hyperlinkcolor">
       <p:transition spd="slow">
         <p:fade/>
       </p:transition>
@@ -14205,7 +14209,7 @@
         </p:nvSpPr>
         <p:spPr>
           <a:xfrm>
-            <a:off x="308144" y="3033664"/>
+            <a:off x="308144" y="2906514"/>
             <a:ext cx="2232900" cy="802200"/>
           </a:xfrm>
           <a:prstGeom prst="roundRect">
@@ -14257,58 +14261,6 @@
                 </a:solidFill>
               </a:rPr>
               <a:t>Attachments</a:t>
-            </a:r>
-            <a:r>
-              <a:rPr lang="en" sz="1400" b="1" i="0" u="none" strike="noStrike" cap="none" dirty="0">
-                <a:solidFill>
-                  <a:schemeClr val="dk1"/>
-                </a:solidFill>
-              </a:rPr>
-              <a:t> and</a:t>
-            </a:r>
-          </a:p>
-          <a:p>
-            <a:pPr marR="0" lvl="0" algn="ctr" rtl="0">
-              <a:spcBef>
-                <a:spcPts val="0"/>
-              </a:spcBef>
-              <a:spcAft>
-                <a:spcPts val="0"/>
-              </a:spcAft>
-            </a:pPr>
-            <a:r>
-              <a:rPr lang="en" sz="1400" b="1" i="0" u="none" strike="noStrike" cap="none" dirty="0">
-                <a:solidFill>
-                  <a:schemeClr val="dk1"/>
-                </a:solidFill>
-              </a:rPr>
-              <a:t>Data </a:t>
-            </a:r>
-            <a:r>
-              <a:rPr lang="en" b="1" dirty="0">
-                <a:solidFill>
-                  <a:schemeClr val="dk1"/>
-                </a:solidFill>
-              </a:rPr>
-              <a:t>Elements for</a:t>
-            </a:r>
-          </a:p>
-          <a:p>
-            <a:pPr marR="0" lvl="0" algn="ctr" rtl="0">
-              <a:spcBef>
-                <a:spcPts val="0"/>
-              </a:spcBef>
-              <a:spcAft>
-                <a:spcPts val="0"/>
-              </a:spcAft>
-            </a:pPr>
-            <a:r>
-              <a:rPr lang="en" b="1" dirty="0">
-                <a:solidFill>
-                  <a:schemeClr val="dk1"/>
-                </a:solidFill>
-              </a:rPr>
-              <a:t>Re-association</a:t>
             </a:r>
             <a:endParaRPr sz="1100" b="1" dirty="0"/>
           </a:p>
@@ -14568,7 +14520,7 @@
         <p:fade/>
       </p:transition>
     </mc:Choice>
-    <mc:Fallback xmlns:ahyp="http://schemas.microsoft.com/office/drawing/2018/hyperlinkcolor" xmlns:p15="http://schemas.microsoft.com/office/powerpoint/2012/main" xmlns:com="http://schemas.openxmlformats.org/drawingml/2006/compatibility" xmlns:pvml="urn:schemas-microsoft-com:office:powerpoint" xmlns:v="urn:schemas-microsoft-com:vml" xmlns:o="urn:schemas-microsoft-com:office:office" xmlns:dgm="http://schemas.openxmlformats.org/drawingml/2006/diagram" xmlns:c="http://schemas.openxmlformats.org/drawingml/2006/chart" xmlns:mv="urn:schemas-microsoft-com:mac:vml" xmlns="">
+    <mc:Fallback xmlns="" xmlns:mv="urn:schemas-microsoft-com:mac:vml" xmlns:c="http://schemas.openxmlformats.org/drawingml/2006/chart" xmlns:dgm="http://schemas.openxmlformats.org/drawingml/2006/diagram" xmlns:o="urn:schemas-microsoft-com:office:office" xmlns:v="urn:schemas-microsoft-com:vml" xmlns:pvml="urn:schemas-microsoft-com:office:powerpoint" xmlns:com="http://schemas.openxmlformats.org/drawingml/2006/compatibility" xmlns:p15="http://schemas.microsoft.com/office/powerpoint/2012/main" xmlns:ahyp="http://schemas.microsoft.com/office/drawing/2018/hyperlinkcolor">
       <p:transition spd="slow">
         <p:fade/>
       </p:transition>

</xml_diff>

<commit_message>
*Pre-Applied: Clarify roles in attachments diagram FHIR-37226
</commit_message>
<xml_diff>
--- a/input/images/source/Workflow Images.pptx
+++ b/input/images/source/Workflow Images.pptx
@@ -14242,25 +14242,15 @@
                   <a:schemeClr val="dk1"/>
                 </a:solidFill>
               </a:rPr>
-              <a:t>1. Provider Submits</a:t>
+              <a:t>1. Provider System Submits</a:t>
             </a:r>
-          </a:p>
-          <a:p>
-            <a:pPr marR="0" lvl="0" algn="ctr" rtl="0">
-              <a:spcBef>
-                <a:spcPts val="0"/>
-              </a:spcBef>
-              <a:spcAft>
-                <a:spcPts val="0"/>
-              </a:spcAft>
-            </a:pPr>
             <a:r>
               <a:rPr lang="en" b="1" dirty="0">
                 <a:solidFill>
                   <a:schemeClr val="dk1"/>
                 </a:solidFill>
               </a:rPr>
-              <a:t>Attachments</a:t>
+              <a:t> Attachments</a:t>
             </a:r>
             <a:endParaRPr sz="1100" b="1" dirty="0"/>
           </a:p>
@@ -14268,39 +14258,12 @@
       </p:sp>
       <p:pic>
         <p:nvPicPr>
-          <p:cNvPr id="132" name="Google Shape;132;p24"/>
+          <p:cNvPr id="133" name="Google Shape;133;p24"/>
           <p:cNvPicPr preferRelativeResize="0"/>
           <p:nvPr/>
         </p:nvPicPr>
         <p:blipFill rotWithShape="1">
           <a:blip r:embed="rId3">
-            <a:alphaModFix/>
-          </a:blip>
-          <a:srcRect/>
-          <a:stretch/>
-        </p:blipFill>
-        <p:spPr>
-          <a:xfrm>
-            <a:off x="1150287" y="2157500"/>
-            <a:ext cx="548615" cy="828500"/>
-          </a:xfrm>
-          <a:prstGeom prst="rect">
-            <a:avLst/>
-          </a:prstGeom>
-          <a:noFill/>
-          <a:ln>
-            <a:noFill/>
-          </a:ln>
-        </p:spPr>
-      </p:pic>
-      <p:pic>
-        <p:nvPicPr>
-          <p:cNvPr id="133" name="Google Shape;133;p24"/>
-          <p:cNvPicPr preferRelativeResize="0"/>
-          <p:nvPr/>
-        </p:nvPicPr>
-        <p:blipFill rotWithShape="1">
-          <a:blip r:embed="rId4">
             <a:alphaModFix/>
           </a:blip>
           <a:srcRect/>
@@ -14327,7 +14290,7 @@
           <p:nvPr/>
         </p:nvPicPr>
         <p:blipFill rotWithShape="1">
-          <a:blip r:embed="rId5">
+          <a:blip r:embed="rId4">
             <a:alphaModFix/>
           </a:blip>
           <a:srcRect/>
@@ -14335,8 +14298,8 @@
         </p:blipFill>
         <p:spPr>
           <a:xfrm>
-            <a:off x="3508908" y="1985474"/>
-            <a:ext cx="1353362" cy="942810"/>
+            <a:off x="3495020" y="2004944"/>
+            <a:ext cx="1479083" cy="942810"/>
           </a:xfrm>
           <a:prstGeom prst="rect">
             <a:avLst/>
@@ -14355,7 +14318,7 @@
         </p:nvSpPr>
         <p:spPr>
           <a:xfrm>
-            <a:off x="3660393" y="2112049"/>
+            <a:off x="3691111" y="2140958"/>
             <a:ext cx="1086900" cy="673500"/>
           </a:xfrm>
           <a:prstGeom prst="roundRect">
@@ -14384,10 +14347,10 @@
               <a:buNone/>
             </a:pPr>
             <a:r>
-              <a:rPr lang="en" sz="1100"/>
-              <a:t>Patient’s latest History &amp; Physical</a:t>
+              <a:rPr lang="en" sz="1100" dirty="0"/>
+              <a:t>e.g., send the patient’s latest History &amp; Physical</a:t>
             </a:r>
-            <a:endParaRPr sz="1100" b="0" i="0" u="none" strike="noStrike" cap="none">
+            <a:endParaRPr sz="1100" b="0" i="0" u="none" strike="noStrike" cap="none" dirty="0">
               <a:solidFill>
                 <a:srgbClr val="000000"/>
               </a:solidFill>
@@ -14438,8 +14401,18 @@
                   <a:schemeClr val="dk1"/>
                 </a:solidFill>
               </a:rPr>
-              <a:t>2. Payer </a:t>
+              <a:t>2. Payer System </a:t>
             </a:r>
+          </a:p>
+          <a:p>
+            <a:pPr marR="0" lvl="0" algn="ctr" rtl="0">
+              <a:spcBef>
+                <a:spcPts val="0"/>
+              </a:spcBef>
+              <a:spcAft>
+                <a:spcPts val="0"/>
+              </a:spcAft>
+            </a:pPr>
             <a:r>
               <a:rPr lang="en" b="1" dirty="0">
                 <a:solidFill>
@@ -14509,6 +14482,41 @@
           </a:p>
         </p:txBody>
       </p:sp>
+      <p:pic>
+        <p:nvPicPr>
+          <p:cNvPr id="10" name="Google Shape;123;p23">
+            <a:extLst>
+              <a:ext uri="{FF2B5EF4-FFF2-40B4-BE49-F238E27FC236}">
+                <a16:creationId xmlns:a16="http://schemas.microsoft.com/office/drawing/2014/main" id="{8BE9A7B3-143D-F47A-61CD-4A0246699161}"/>
+              </a:ext>
+            </a:extLst>
+          </p:cNvPr>
+          <p:cNvPicPr preferRelativeResize="0">
+            <a:picLocks noChangeAspect="1"/>
+          </p:cNvPicPr>
+          <p:nvPr/>
+        </p:nvPicPr>
+        <p:blipFill rotWithShape="1">
+          <a:blip r:embed="rId5">
+            <a:alphaModFix/>
+          </a:blip>
+          <a:srcRect/>
+          <a:stretch/>
+        </p:blipFill>
+        <p:spPr>
+          <a:xfrm>
+            <a:off x="985167" y="2205990"/>
+            <a:ext cx="878854" cy="731520"/>
+          </a:xfrm>
+          <a:prstGeom prst="rect">
+            <a:avLst/>
+          </a:prstGeom>
+          <a:noFill/>
+          <a:ln>
+            <a:noFill/>
+          </a:ln>
+        </p:spPr>
+      </p:pic>
     </p:spTree>
   </p:cSld>
   <p:clrMapOvr>

</xml_diff>

<commit_message>
**Pre-Applied** Update Figure FHIR-36918
</commit_message>
<xml_diff>
--- a/input/images/source/Workflow Images.pptx
+++ b/input/images/source/Workflow Images.pptx
@@ -14104,7 +14104,7 @@
         <p:fade/>
       </p:transition>
     </mc:Choice>
-    <mc:Fallback xmlns="" xmlns:mv="urn:schemas-microsoft-com:mac:vml" xmlns:c="http://schemas.openxmlformats.org/drawingml/2006/chart" xmlns:dgm="http://schemas.openxmlformats.org/drawingml/2006/diagram" xmlns:o="urn:schemas-microsoft-com:office:office" xmlns:v="urn:schemas-microsoft-com:vml" xmlns:pvml="urn:schemas-microsoft-com:office:powerpoint" xmlns:com="http://schemas.openxmlformats.org/drawingml/2006/compatibility" xmlns:p15="http://schemas.microsoft.com/office/powerpoint/2012/main" xmlns:ahyp="http://schemas.microsoft.com/office/drawing/2018/hyperlinkcolor">
+    <mc:Fallback xmlns:ahyp="http://schemas.microsoft.com/office/drawing/2018/hyperlinkcolor" xmlns:p15="http://schemas.microsoft.com/office/powerpoint/2012/main" xmlns:com="http://schemas.openxmlformats.org/drawingml/2006/compatibility" xmlns:pvml="urn:schemas-microsoft-com:office:powerpoint" xmlns:v="urn:schemas-microsoft-com:vml" xmlns:o="urn:schemas-microsoft-com:office:office" xmlns:dgm="http://schemas.openxmlformats.org/drawingml/2006/diagram" xmlns:c="http://schemas.openxmlformats.org/drawingml/2006/chart" xmlns:mv="urn:schemas-microsoft-com:mac:vml" xmlns="">
       <p:transition spd="slow">
         <p:fade/>
       </p:transition>
@@ -14209,7 +14209,7 @@
         </p:nvSpPr>
         <p:spPr>
           <a:xfrm>
-            <a:off x="308144" y="2906514"/>
+            <a:off x="331004" y="3419214"/>
             <a:ext cx="2232900" cy="802200"/>
           </a:xfrm>
           <a:prstGeom prst="roundRect">
@@ -14271,7 +14271,7 @@
         </p:blipFill>
         <p:spPr>
           <a:xfrm>
-            <a:off x="6771527" y="2109624"/>
+            <a:off x="6794387" y="2646224"/>
             <a:ext cx="663605" cy="733450"/>
           </a:xfrm>
           <a:prstGeom prst="rect">
@@ -14298,7 +14298,7 @@
         </p:blipFill>
         <p:spPr>
           <a:xfrm>
-            <a:off x="3495020" y="2004944"/>
+            <a:off x="4378613" y="2629207"/>
             <a:ext cx="1479083" cy="942810"/>
           </a:xfrm>
           <a:prstGeom prst="rect">
@@ -14318,7 +14318,7 @@
         </p:nvSpPr>
         <p:spPr>
           <a:xfrm>
-            <a:off x="3691111" y="2140958"/>
+            <a:off x="4574704" y="2765221"/>
             <a:ext cx="1086900" cy="673500"/>
           </a:xfrm>
           <a:prstGeom prst="roundRect">
@@ -14337,28 +14337,10 @@
           </a:bodyPr>
           <a:lstStyle/>
           <a:p>
-            <a:pPr marL="0" marR="0" lvl="0" indent="0" algn="l" rtl="0">
-              <a:spcBef>
-                <a:spcPts val="0"/>
-              </a:spcBef>
-              <a:spcAft>
-                <a:spcPts val="0"/>
-              </a:spcAft>
-              <a:buNone/>
-            </a:pPr>
             <a:r>
-              <a:rPr lang="en" sz="1100" dirty="0"/>
-              <a:t>e.g., send the patient’s latest History &amp; Physical</a:t>
+              <a:rPr lang="en-US" sz="1000" dirty="0"/>
+              <a:t>missing information (provider details)</a:t>
             </a:r>
-            <a:endParaRPr sz="1100" b="0" i="0" u="none" strike="noStrike" cap="none" dirty="0">
-              <a:solidFill>
-                <a:srgbClr val="000000"/>
-              </a:solidFill>
-              <a:latin typeface="Arial"/>
-              <a:ea typeface="Arial"/>
-              <a:cs typeface="Arial"/>
-              <a:sym typeface="Arial"/>
-            </a:endParaRPr>
           </a:p>
         </p:txBody>
       </p:sp>
@@ -14370,7 +14352,7 @@
         </p:nvSpPr>
         <p:spPr>
           <a:xfrm>
-            <a:off x="5928079" y="3033664"/>
+            <a:off x="5950939" y="3570264"/>
             <a:ext cx="2350500" cy="500100"/>
           </a:xfrm>
           <a:prstGeom prst="rect">
@@ -14433,8 +14415,8 @@
         </p:nvSpPr>
         <p:spPr>
           <a:xfrm>
-            <a:off x="2681206" y="3033664"/>
-            <a:ext cx="3201300" cy="276900"/>
+            <a:off x="2555667" y="3681864"/>
+            <a:ext cx="3547336" cy="276900"/>
           </a:xfrm>
           <a:prstGeom prst="rightArrow">
             <a:avLst>
@@ -14505,7 +14487,7 @@
         </p:blipFill>
         <p:spPr>
           <a:xfrm>
-            <a:off x="985167" y="2205990"/>
+            <a:off x="1008027" y="2742590"/>
             <a:ext cx="878854" cy="731520"/>
           </a:xfrm>
           <a:prstGeom prst="rect">
@@ -14517,6 +14499,180 @@
           </a:ln>
         </p:spPr>
       </p:pic>
+      <p:pic>
+        <p:nvPicPr>
+          <p:cNvPr id="11" name="Google Shape;134;p24">
+            <a:extLst>
+              <a:ext uri="{FF2B5EF4-FFF2-40B4-BE49-F238E27FC236}">
+                <a16:creationId xmlns:a16="http://schemas.microsoft.com/office/drawing/2014/main" id="{F0BFA278-8D91-B6D5-5645-F5A81FDD12AE}"/>
+              </a:ext>
+            </a:extLst>
+          </p:cNvPr>
+          <p:cNvPicPr preferRelativeResize="0"/>
+          <p:nvPr/>
+        </p:nvPicPr>
+        <p:blipFill rotWithShape="1">
+          <a:blip r:embed="rId4">
+            <a:alphaModFix/>
+          </a:blip>
+          <a:srcRect/>
+          <a:stretch/>
+        </p:blipFill>
+        <p:spPr>
+          <a:xfrm>
+            <a:off x="3639071" y="1643442"/>
+            <a:ext cx="1479083" cy="942810"/>
+          </a:xfrm>
+          <a:prstGeom prst="rect">
+            <a:avLst/>
+          </a:prstGeom>
+          <a:noFill/>
+          <a:ln>
+            <a:noFill/>
+          </a:ln>
+        </p:spPr>
+      </p:pic>
+      <p:sp>
+        <p:nvSpPr>
+          <p:cNvPr id="12" name="Google Shape;135;p24">
+            <a:extLst>
+              <a:ext uri="{FF2B5EF4-FFF2-40B4-BE49-F238E27FC236}">
+                <a16:creationId xmlns:a16="http://schemas.microsoft.com/office/drawing/2014/main" id="{A546656B-724C-1E80-1F62-E979BEC78456}"/>
+              </a:ext>
+            </a:extLst>
+          </p:cNvPr>
+          <p:cNvSpPr/>
+          <p:nvPr/>
+        </p:nvSpPr>
+        <p:spPr>
+          <a:xfrm>
+            <a:off x="3835162" y="1779456"/>
+            <a:ext cx="1086900" cy="673500"/>
+          </a:xfrm>
+          <a:prstGeom prst="roundRect">
+            <a:avLst>
+              <a:gd name="adj" fmla="val 0"/>
+            </a:avLst>
+          </a:prstGeom>
+          <a:noFill/>
+          <a:ln>
+            <a:noFill/>
+          </a:ln>
+        </p:spPr>
+        <p:txBody>
+          <a:bodyPr spcFirstLastPara="1" wrap="square" lIns="68575" tIns="34275" rIns="68575" bIns="34275" anchor="ctr" anchorCtr="0">
+            <a:noAutofit/>
+          </a:bodyPr>
+          <a:lstStyle/>
+          <a:p>
+            <a:pPr marL="0" marR="0" lvl="0" indent="0" algn="l" rtl="0">
+              <a:spcBef>
+                <a:spcPts val="0"/>
+              </a:spcBef>
+              <a:spcAft>
+                <a:spcPts val="0"/>
+              </a:spcAft>
+              <a:buNone/>
+            </a:pPr>
+            <a:r>
+              <a:rPr lang="en" sz="1000" dirty="0"/>
+              <a:t>e.g., documents such as History &amp; Physical</a:t>
+            </a:r>
+            <a:endParaRPr sz="1000" b="0" i="0" u="none" strike="noStrike" cap="none" dirty="0">
+              <a:solidFill>
+                <a:srgbClr val="000000"/>
+              </a:solidFill>
+              <a:latin typeface="Arial"/>
+              <a:ea typeface="Arial"/>
+              <a:cs typeface="Arial"/>
+              <a:sym typeface="Arial"/>
+            </a:endParaRPr>
+          </a:p>
+        </p:txBody>
+      </p:sp>
+      <p:pic>
+        <p:nvPicPr>
+          <p:cNvPr id="13" name="Google Shape;134;p24">
+            <a:extLst>
+              <a:ext uri="{FF2B5EF4-FFF2-40B4-BE49-F238E27FC236}">
+                <a16:creationId xmlns:a16="http://schemas.microsoft.com/office/drawing/2014/main" id="{C61FB977-6AAB-800B-5725-D621BDDE339C}"/>
+              </a:ext>
+            </a:extLst>
+          </p:cNvPr>
+          <p:cNvPicPr preferRelativeResize="0"/>
+          <p:nvPr/>
+        </p:nvPicPr>
+        <p:blipFill rotWithShape="1">
+          <a:blip r:embed="rId4">
+            <a:alphaModFix/>
+          </a:blip>
+          <a:srcRect/>
+          <a:stretch/>
+        </p:blipFill>
+        <p:spPr>
+          <a:xfrm>
+            <a:off x="2823572" y="2629207"/>
+            <a:ext cx="1479083" cy="942810"/>
+          </a:xfrm>
+          <a:prstGeom prst="rect">
+            <a:avLst/>
+          </a:prstGeom>
+          <a:noFill/>
+          <a:ln>
+            <a:noFill/>
+          </a:ln>
+        </p:spPr>
+      </p:pic>
+      <p:sp>
+        <p:nvSpPr>
+          <p:cNvPr id="14" name="Google Shape;135;p24">
+            <a:extLst>
+              <a:ext uri="{FF2B5EF4-FFF2-40B4-BE49-F238E27FC236}">
+                <a16:creationId xmlns:a16="http://schemas.microsoft.com/office/drawing/2014/main" id="{E8D0997D-EA8B-9BC5-ACDE-618B241083EE}"/>
+              </a:ext>
+            </a:extLst>
+          </p:cNvPr>
+          <p:cNvSpPr/>
+          <p:nvPr/>
+        </p:nvSpPr>
+        <p:spPr>
+          <a:xfrm>
+            <a:off x="3019663" y="2765221"/>
+            <a:ext cx="1086900" cy="673500"/>
+          </a:xfrm>
+          <a:prstGeom prst="roundRect">
+            <a:avLst>
+              <a:gd name="adj" fmla="val 0"/>
+            </a:avLst>
+          </a:prstGeom>
+          <a:noFill/>
+          <a:ln>
+            <a:noFill/>
+          </a:ln>
+        </p:spPr>
+        <p:txBody>
+          <a:bodyPr spcFirstLastPara="1" wrap="square" lIns="68575" tIns="34275" rIns="68575" bIns="34275" anchor="ctr" anchorCtr="0">
+            <a:noAutofit/>
+          </a:bodyPr>
+          <a:lstStyle/>
+          <a:p>
+            <a:pPr lvl="0"/>
+            <a:r>
+              <a:rPr lang="en-US" sz="1000" dirty="0"/>
+              <a:t>study report (pathology, radiology, etc.)</a:t>
+            </a:r>
+            <a:endParaRPr sz="1000" b="0" i="0" u="none" strike="noStrike" cap="none" dirty="0">
+              <a:solidFill>
+                <a:srgbClr val="000000"/>
+              </a:solidFill>
+              <a:latin typeface="Arial"/>
+              <a:ea typeface="Arial"/>
+              <a:cs typeface="Arial"/>
+              <a:sym typeface="Arial"/>
+            </a:endParaRPr>
+          </a:p>
+        </p:txBody>
+      </p:sp>
     </p:spTree>
   </p:cSld>
   <p:clrMapOvr>
@@ -14528,7 +14684,7 @@
         <p:fade/>
       </p:transition>
     </mc:Choice>
-    <mc:Fallback xmlns="" xmlns:mv="urn:schemas-microsoft-com:mac:vml" xmlns:c="http://schemas.openxmlformats.org/drawingml/2006/chart" xmlns:dgm="http://schemas.openxmlformats.org/drawingml/2006/diagram" xmlns:o="urn:schemas-microsoft-com:office:office" xmlns:v="urn:schemas-microsoft-com:vml" xmlns:pvml="urn:schemas-microsoft-com:office:powerpoint" xmlns:com="http://schemas.openxmlformats.org/drawingml/2006/compatibility" xmlns:p15="http://schemas.microsoft.com/office/powerpoint/2012/main" xmlns:ahyp="http://schemas.microsoft.com/office/drawing/2018/hyperlinkcolor">
+    <mc:Fallback xmlns:ahyp="http://schemas.microsoft.com/office/drawing/2018/hyperlinkcolor" xmlns:p15="http://schemas.microsoft.com/office/powerpoint/2012/main" xmlns:com="http://schemas.openxmlformats.org/drawingml/2006/compatibility" xmlns:pvml="urn:schemas-microsoft-com:office:powerpoint" xmlns:v="urn:schemas-microsoft-com:vml" xmlns:o="urn:schemas-microsoft-com:office:office" xmlns:dgm="http://schemas.openxmlformats.org/drawingml/2006/diagram" xmlns:c="http://schemas.openxmlformats.org/drawingml/2006/chart" xmlns:mv="urn:schemas-microsoft-com:mac:vml" xmlns="">
       <p:transition spd="slow">
         <p:fade/>
       </p:transition>

</xml_diff>